<commit_message>
Updates Methods and Results after a bug was found. Working through Results - Control still. Adds new BodyBloodAge sheets.
</commit_message>
<xml_diff>
--- a/Body Age Predictor - Combined Attributes - All.pptx
+++ b/Body Age Predictor - Combined Attributes - All.pptx
@@ -6,15 +6,16 @@
   </p:sldMasterIdLst>
   <p:sldIdLst>
     <p:sldId id="256" r:id="rId2"/>
-    <p:sldId id="262" r:id="rId3"/>
-    <p:sldId id="263" r:id="rId4"/>
-    <p:sldId id="264" r:id="rId5"/>
-    <p:sldId id="265" r:id="rId6"/>
-    <p:sldId id="266" r:id="rId7"/>
-    <p:sldId id="267" r:id="rId8"/>
-    <p:sldId id="268" r:id="rId9"/>
-    <p:sldId id="269" r:id="rId10"/>
-    <p:sldId id="270" r:id="rId11"/>
+    <p:sldId id="271" r:id="rId3"/>
+    <p:sldId id="262" r:id="rId4"/>
+    <p:sldId id="263" r:id="rId5"/>
+    <p:sldId id="264" r:id="rId6"/>
+    <p:sldId id="265" r:id="rId7"/>
+    <p:sldId id="266" r:id="rId8"/>
+    <p:sldId id="267" r:id="rId9"/>
+    <p:sldId id="268" r:id="rId10"/>
+    <p:sldId id="269" r:id="rId11"/>
+    <p:sldId id="270" r:id="rId12"/>
   </p:sldIdLst>
   <p:sldSz cx="12192000" cy="6858000"/>
   <p:notesSz cx="6858000" cy="9144000"/>
@@ -268,7 +269,7 @@
           <a:p>
             <a:fld id="{5E81D1EB-91C6-4D20-994F-A5DCC5FFEC9F}" type="datetimeFigureOut">
               <a:rPr lang="en-US" smtClean="0"/>
-              <a:t>5/15/2019</a:t>
+              <a:t>5/16/2019</a:t>
             </a:fld>
             <a:endParaRPr lang="en-US"/>
           </a:p>
@@ -466,7 +467,7 @@
           <a:p>
             <a:fld id="{5E81D1EB-91C6-4D20-994F-A5DCC5FFEC9F}" type="datetimeFigureOut">
               <a:rPr lang="en-US" smtClean="0"/>
-              <a:t>5/15/2019</a:t>
+              <a:t>5/16/2019</a:t>
             </a:fld>
             <a:endParaRPr lang="en-US"/>
           </a:p>
@@ -674,7 +675,7 @@
           <a:p>
             <a:fld id="{5E81D1EB-91C6-4D20-994F-A5DCC5FFEC9F}" type="datetimeFigureOut">
               <a:rPr lang="en-US" smtClean="0"/>
-              <a:t>5/15/2019</a:t>
+              <a:t>5/16/2019</a:t>
             </a:fld>
             <a:endParaRPr lang="en-US"/>
           </a:p>
@@ -872,7 +873,7 @@
           <a:p>
             <a:fld id="{5E81D1EB-91C6-4D20-994F-A5DCC5FFEC9F}" type="datetimeFigureOut">
               <a:rPr lang="en-US" smtClean="0"/>
-              <a:t>5/15/2019</a:t>
+              <a:t>5/16/2019</a:t>
             </a:fld>
             <a:endParaRPr lang="en-US"/>
           </a:p>
@@ -1147,7 +1148,7 @@
           <a:p>
             <a:fld id="{5E81D1EB-91C6-4D20-994F-A5DCC5FFEC9F}" type="datetimeFigureOut">
               <a:rPr lang="en-US" smtClean="0"/>
-              <a:t>5/15/2019</a:t>
+              <a:t>5/16/2019</a:t>
             </a:fld>
             <a:endParaRPr lang="en-US"/>
           </a:p>
@@ -1412,7 +1413,7 @@
           <a:p>
             <a:fld id="{5E81D1EB-91C6-4D20-994F-A5DCC5FFEC9F}" type="datetimeFigureOut">
               <a:rPr lang="en-US" smtClean="0"/>
-              <a:t>5/15/2019</a:t>
+              <a:t>5/16/2019</a:t>
             </a:fld>
             <a:endParaRPr lang="en-US"/>
           </a:p>
@@ -1824,7 +1825,7 @@
           <a:p>
             <a:fld id="{5E81D1EB-91C6-4D20-994F-A5DCC5FFEC9F}" type="datetimeFigureOut">
               <a:rPr lang="en-US" smtClean="0"/>
-              <a:t>5/15/2019</a:t>
+              <a:t>5/16/2019</a:t>
             </a:fld>
             <a:endParaRPr lang="en-US"/>
           </a:p>
@@ -1965,7 +1966,7 @@
           <a:p>
             <a:fld id="{5E81D1EB-91C6-4D20-994F-A5DCC5FFEC9F}" type="datetimeFigureOut">
               <a:rPr lang="en-US" smtClean="0"/>
-              <a:t>5/15/2019</a:t>
+              <a:t>5/16/2019</a:t>
             </a:fld>
             <a:endParaRPr lang="en-US"/>
           </a:p>
@@ -2078,7 +2079,7 @@
           <a:p>
             <a:fld id="{5E81D1EB-91C6-4D20-994F-A5DCC5FFEC9F}" type="datetimeFigureOut">
               <a:rPr lang="en-US" smtClean="0"/>
-              <a:t>5/15/2019</a:t>
+              <a:t>5/16/2019</a:t>
             </a:fld>
             <a:endParaRPr lang="en-US"/>
           </a:p>
@@ -2389,7 +2390,7 @@
           <a:p>
             <a:fld id="{5E81D1EB-91C6-4D20-994F-A5DCC5FFEC9F}" type="datetimeFigureOut">
               <a:rPr lang="en-US" smtClean="0"/>
-              <a:t>5/15/2019</a:t>
+              <a:t>5/16/2019</a:t>
             </a:fld>
             <a:endParaRPr lang="en-US"/>
           </a:p>
@@ -2677,7 +2678,7 @@
           <a:p>
             <a:fld id="{5E81D1EB-91C6-4D20-994F-A5DCC5FFEC9F}" type="datetimeFigureOut">
               <a:rPr lang="en-US" smtClean="0"/>
-              <a:t>5/15/2019</a:t>
+              <a:t>5/16/2019</a:t>
             </a:fld>
             <a:endParaRPr lang="en-US"/>
           </a:p>
@@ -2918,7 +2919,7 @@
           <a:p>
             <a:fld id="{5E81D1EB-91C6-4D20-994F-A5DCC5FFEC9F}" type="datetimeFigureOut">
               <a:rPr lang="en-US" smtClean="0"/>
-              <a:t>5/15/2019</a:t>
+              <a:t>5/16/2019</a:t>
             </a:fld>
             <a:endParaRPr lang="en-US"/>
           </a:p>
@@ -3444,17 +3445,22 @@
           <a:p>
             <a:r>
               <a:rPr lang="en-US" dirty="0"/>
-              <a:t>Age prediction – SGD Regressor</a:t>
-            </a:r>
+              <a:t>Age prediction – </a:t>
+            </a:r>
+            <a:r>
+              <a:rPr lang="en-US" dirty="0" err="1"/>
+              <a:t>BayesianRidge</a:t>
+            </a:r>
+            <a:endParaRPr lang="en-US" dirty="0"/>
           </a:p>
         </p:txBody>
       </p:sp>
       <p:pic>
         <p:nvPicPr>
-          <p:cNvPr id="5" name="Picture 4">
-            <a:extLst>
-              <a:ext uri="{FF2B5EF4-FFF2-40B4-BE49-F238E27FC236}">
-                <a16:creationId xmlns:a16="http://schemas.microsoft.com/office/drawing/2014/main" id="{62CC859B-64E9-405F-83B8-C4B48F739C5E}"/>
+          <p:cNvPr id="3" name="Picture 2">
+            <a:extLst>
+              <a:ext uri="{FF2B5EF4-FFF2-40B4-BE49-F238E27FC236}">
+                <a16:creationId xmlns:a16="http://schemas.microsoft.com/office/drawing/2014/main" id="{61EB1469-3DBF-4A88-936F-9A08838F7312}"/>
               </a:ext>
             </a:extLst>
           </p:cNvPr>
@@ -3471,8 +3477,8 @@
         </p:blipFill>
         <p:spPr>
           <a:xfrm>
-            <a:off x="5669207" y="1690688"/>
-            <a:ext cx="5495925" cy="4457700"/>
+            <a:off x="4400550" y="1690688"/>
+            <a:ext cx="5562600" cy="4533900"/>
           </a:xfrm>
           <a:prstGeom prst="rect">
             <a:avLst/>
@@ -3484,7 +3490,7 @@
           <p:cNvPr id="6" name="Picture 5">
             <a:extLst>
               <a:ext uri="{FF2B5EF4-FFF2-40B4-BE49-F238E27FC236}">
-                <a16:creationId xmlns:a16="http://schemas.microsoft.com/office/drawing/2014/main" id="{3BD6D009-1F35-4CC4-B8E7-8DE8A6ABE786}"/>
+                <a16:creationId xmlns:a16="http://schemas.microsoft.com/office/drawing/2014/main" id="{1EFBCCDA-1C41-465A-8F01-071D64D08703}"/>
               </a:ext>
             </a:extLst>
           </p:cNvPr>
@@ -3501,8 +3507,132 @@
         </p:blipFill>
         <p:spPr>
           <a:xfrm>
-            <a:off x="1067899" y="3586163"/>
-            <a:ext cx="3162300" cy="666750"/>
+            <a:off x="614362" y="3629026"/>
+            <a:ext cx="3228975" cy="704850"/>
+          </a:xfrm>
+          <a:prstGeom prst="rect">
+            <a:avLst/>
+          </a:prstGeom>
+        </p:spPr>
+      </p:pic>
+    </p:spTree>
+    <p:extLst>
+      <p:ext uri="{BB962C8B-B14F-4D97-AF65-F5344CB8AC3E}">
+        <p14:creationId xmlns:p14="http://schemas.microsoft.com/office/powerpoint/2010/main" val="141751099"/>
+      </p:ext>
+    </p:extLst>
+  </p:cSld>
+  <p:clrMapOvr>
+    <a:masterClrMapping/>
+  </p:clrMapOvr>
+</p:sld>
+</file>
+
+<file path=ppt/slides/slide11.xml><?xml version="1.0" encoding="utf-8"?>
+<p:sld xmlns:a="http://schemas.openxmlformats.org/drawingml/2006/main" xmlns:r="http://schemas.openxmlformats.org/officeDocument/2006/relationships" xmlns:p="http://schemas.openxmlformats.org/presentationml/2006/main">
+  <p:cSld>
+    <p:spTree>
+      <p:nvGrpSpPr>
+        <p:cNvPr id="1" name=""/>
+        <p:cNvGrpSpPr/>
+        <p:nvPr/>
+      </p:nvGrpSpPr>
+      <p:grpSpPr>
+        <a:xfrm>
+          <a:off x="0" y="0"/>
+          <a:ext cx="0" cy="0"/>
+          <a:chOff x="0" y="0"/>
+          <a:chExt cx="0" cy="0"/>
+        </a:xfrm>
+      </p:grpSpPr>
+      <p:sp>
+        <p:nvSpPr>
+          <p:cNvPr id="2" name="Title 1">
+            <a:extLst>
+              <a:ext uri="{FF2B5EF4-FFF2-40B4-BE49-F238E27FC236}">
+                <a16:creationId xmlns:a16="http://schemas.microsoft.com/office/drawing/2014/main" id="{CDB4C8D3-73CB-4B45-8585-37505885F2DA}"/>
+              </a:ext>
+            </a:extLst>
+          </p:cNvPr>
+          <p:cNvSpPr>
+            <a:spLocks noGrp="1"/>
+          </p:cNvSpPr>
+          <p:nvPr>
+            <p:ph type="title"/>
+          </p:nvPr>
+        </p:nvSpPr>
+        <p:spPr>
+          <a:xfrm>
+            <a:off x="838200" y="365125"/>
+            <a:ext cx="10515600" cy="1325563"/>
+          </a:xfrm>
+        </p:spPr>
+        <p:txBody>
+          <a:bodyPr/>
+          <a:lstStyle/>
+          <a:p>
+            <a:r>
+              <a:rPr lang="en-US"/>
+              <a:t>Age prediction – SGD Regressor</a:t>
+            </a:r>
+            <a:endParaRPr lang="en-US" dirty="0"/>
+          </a:p>
+        </p:txBody>
+      </p:sp>
+      <p:pic>
+        <p:nvPicPr>
+          <p:cNvPr id="9" name="Picture 8">
+            <a:extLst>
+              <a:ext uri="{FF2B5EF4-FFF2-40B4-BE49-F238E27FC236}">
+                <a16:creationId xmlns:a16="http://schemas.microsoft.com/office/drawing/2014/main" id="{FE6FF9BF-16EF-4D15-AF77-630E2CFF1810}"/>
+              </a:ext>
+            </a:extLst>
+          </p:cNvPr>
+          <p:cNvPicPr>
+            <a:picLocks noChangeAspect="1"/>
+          </p:cNvPicPr>
+          <p:nvPr/>
+        </p:nvPicPr>
+        <p:blipFill>
+          <a:blip r:embed="rId2"/>
+          <a:stretch>
+            <a:fillRect/>
+          </a:stretch>
+        </p:blipFill>
+        <p:spPr>
+          <a:xfrm>
+            <a:off x="4238625" y="1690688"/>
+            <a:ext cx="5505450" cy="4543425"/>
+          </a:xfrm>
+          <a:prstGeom prst="rect">
+            <a:avLst/>
+          </a:prstGeom>
+        </p:spPr>
+      </p:pic>
+      <p:pic>
+        <p:nvPicPr>
+          <p:cNvPr id="10" name="Picture 9">
+            <a:extLst>
+              <a:ext uri="{FF2B5EF4-FFF2-40B4-BE49-F238E27FC236}">
+                <a16:creationId xmlns:a16="http://schemas.microsoft.com/office/drawing/2014/main" id="{897E2A67-2BB4-4D4C-A8FF-43F812204D0E}"/>
+              </a:ext>
+            </a:extLst>
+          </p:cNvPr>
+          <p:cNvPicPr>
+            <a:picLocks noChangeAspect="1"/>
+          </p:cNvPicPr>
+          <p:nvPr/>
+        </p:nvPicPr>
+        <p:blipFill>
+          <a:blip r:embed="rId3"/>
+          <a:stretch>
+            <a:fillRect/>
+          </a:stretch>
+        </p:blipFill>
+        <p:spPr>
+          <a:xfrm>
+            <a:off x="585787" y="3829050"/>
+            <a:ext cx="3171825" cy="685800"/>
           </a:xfrm>
           <a:prstGeom prst="rect">
             <a:avLst/>
@@ -3544,7 +3674,7 @@
           <p:cNvPr id="2" name="Title 1">
             <a:extLst>
               <a:ext uri="{FF2B5EF4-FFF2-40B4-BE49-F238E27FC236}">
-                <a16:creationId xmlns:a16="http://schemas.microsoft.com/office/drawing/2014/main" id="{CDB4C8D3-73CB-4B45-8585-37505885F2DA}"/>
+                <a16:creationId xmlns:a16="http://schemas.microsoft.com/office/drawing/2014/main" id="{6FF8EBD2-40A0-4C77-BC85-C1379B139DAF}"/>
               </a:ext>
             </a:extLst>
           </p:cNvPr>
@@ -3562,17 +3692,17 @@
           <a:p>
             <a:r>
               <a:rPr lang="en-US" dirty="0"/>
-              <a:t>Age prediction – Linear Regression</a:t>
+              <a:t>Multicollinearity</a:t>
             </a:r>
           </a:p>
         </p:txBody>
       </p:sp>
       <p:pic>
         <p:nvPicPr>
-          <p:cNvPr id="7" name="Picture 6">
-            <a:extLst>
-              <a:ext uri="{FF2B5EF4-FFF2-40B4-BE49-F238E27FC236}">
-                <a16:creationId xmlns:a16="http://schemas.microsoft.com/office/drawing/2014/main" id="{A6B3E8EC-51D0-4346-9AC8-657DF885EC1C}"/>
+          <p:cNvPr id="5" name="Picture 4">
+            <a:extLst>
+              <a:ext uri="{FF2B5EF4-FFF2-40B4-BE49-F238E27FC236}">
+                <a16:creationId xmlns:a16="http://schemas.microsoft.com/office/drawing/2014/main" id="{396913E9-8B6D-4222-893A-0968DA175DD9}"/>
               </a:ext>
             </a:extLst>
           </p:cNvPr>
@@ -3589,38 +3719,8 @@
         </p:blipFill>
         <p:spPr>
           <a:xfrm>
-            <a:off x="5810250" y="1567363"/>
-            <a:ext cx="5543550" cy="4429125"/>
-          </a:xfrm>
-          <a:prstGeom prst="rect">
-            <a:avLst/>
-          </a:prstGeom>
-        </p:spPr>
-      </p:pic>
-      <p:pic>
-        <p:nvPicPr>
-          <p:cNvPr id="8" name="Picture 7">
-            <a:extLst>
-              <a:ext uri="{FF2B5EF4-FFF2-40B4-BE49-F238E27FC236}">
-                <a16:creationId xmlns:a16="http://schemas.microsoft.com/office/drawing/2014/main" id="{9761A62A-60E2-4C79-AF00-6D6AC46370B7}"/>
-              </a:ext>
-            </a:extLst>
-          </p:cNvPr>
-          <p:cNvPicPr>
-            <a:picLocks noChangeAspect="1"/>
-          </p:cNvPicPr>
-          <p:nvPr/>
-        </p:nvPicPr>
-        <p:blipFill>
-          <a:blip r:embed="rId3"/>
-          <a:stretch>
-            <a:fillRect/>
-          </a:stretch>
-        </p:blipFill>
-        <p:spPr>
-          <a:xfrm>
-            <a:off x="1616319" y="3493977"/>
-            <a:ext cx="3181350" cy="676275"/>
+            <a:off x="2015194" y="1581201"/>
+            <a:ext cx="7058468" cy="5212322"/>
           </a:xfrm>
           <a:prstGeom prst="rect">
             <a:avLst/>
@@ -3630,7 +3730,7 @@
     </p:spTree>
     <p:extLst>
       <p:ext uri="{BB962C8B-B14F-4D97-AF65-F5344CB8AC3E}">
-        <p14:creationId xmlns:p14="http://schemas.microsoft.com/office/powerpoint/2010/main" val="3861578825"/>
+        <p14:creationId xmlns:p14="http://schemas.microsoft.com/office/powerpoint/2010/main" val="3744358163"/>
       </p:ext>
     </p:extLst>
   </p:cSld>
@@ -3680,17 +3780,17 @@
           <a:p>
             <a:r>
               <a:rPr lang="en-US" dirty="0"/>
-              <a:t>Age prediction – SVM with RBF kernel</a:t>
+              <a:t>Age prediction – Linear Regression</a:t>
             </a:r>
           </a:p>
         </p:txBody>
       </p:sp>
       <p:pic>
         <p:nvPicPr>
-          <p:cNvPr id="3" name="Picture 2">
-            <a:extLst>
-              <a:ext uri="{FF2B5EF4-FFF2-40B4-BE49-F238E27FC236}">
-                <a16:creationId xmlns:a16="http://schemas.microsoft.com/office/drawing/2014/main" id="{4DB09E77-6A6C-4E9F-82E7-497E1E8BA3B1}"/>
+          <p:cNvPr id="5" name="Picture 4">
+            <a:extLst>
+              <a:ext uri="{FF2B5EF4-FFF2-40B4-BE49-F238E27FC236}">
+                <a16:creationId xmlns:a16="http://schemas.microsoft.com/office/drawing/2014/main" id="{01302777-8638-44AD-80B0-A8908A9786C4}"/>
               </a:ext>
             </a:extLst>
           </p:cNvPr>
@@ -3707,8 +3807,8 @@
         </p:blipFill>
         <p:spPr>
           <a:xfrm>
-            <a:off x="5754198" y="1690688"/>
-            <a:ext cx="5419725" cy="4533900"/>
+            <a:off x="5629275" y="1350169"/>
+            <a:ext cx="5724525" cy="4514850"/>
           </a:xfrm>
           <a:prstGeom prst="rect">
             <a:avLst/>
@@ -3717,10 +3817,10 @@
       </p:pic>
       <p:pic>
         <p:nvPicPr>
-          <p:cNvPr id="4" name="Picture 3">
-            <a:extLst>
-              <a:ext uri="{FF2B5EF4-FFF2-40B4-BE49-F238E27FC236}">
-                <a16:creationId xmlns:a16="http://schemas.microsoft.com/office/drawing/2014/main" id="{2D8EE8F8-2950-485B-A0A4-7F811AE5B96A}"/>
+          <p:cNvPr id="6" name="Picture 5">
+            <a:extLst>
+              <a:ext uri="{FF2B5EF4-FFF2-40B4-BE49-F238E27FC236}">
+                <a16:creationId xmlns:a16="http://schemas.microsoft.com/office/drawing/2014/main" id="{D942AF66-9471-4FD8-90B8-DAD787424F2F}"/>
               </a:ext>
             </a:extLst>
           </p:cNvPr>
@@ -3737,8 +3837,8 @@
         </p:blipFill>
         <p:spPr>
           <a:xfrm>
-            <a:off x="1190258" y="3624263"/>
-            <a:ext cx="3152775" cy="666750"/>
+            <a:off x="1260231" y="3607594"/>
+            <a:ext cx="3200400" cy="666750"/>
           </a:xfrm>
           <a:prstGeom prst="rect">
             <a:avLst/>
@@ -3748,7 +3848,7 @@
     </p:spTree>
     <p:extLst>
       <p:ext uri="{BB962C8B-B14F-4D97-AF65-F5344CB8AC3E}">
-        <p14:creationId xmlns:p14="http://schemas.microsoft.com/office/powerpoint/2010/main" val="2885476304"/>
+        <p14:creationId xmlns:p14="http://schemas.microsoft.com/office/powerpoint/2010/main" val="3861578825"/>
       </p:ext>
     </p:extLst>
   </p:cSld>
@@ -3798,17 +3898,17 @@
           <a:p>
             <a:r>
               <a:rPr lang="en-US" dirty="0"/>
-              <a:t>Age prediction – SVM linear</a:t>
+              <a:t>Age prediction – SVM with RBF kernel</a:t>
             </a:r>
           </a:p>
         </p:txBody>
       </p:sp>
       <p:pic>
         <p:nvPicPr>
-          <p:cNvPr id="3" name="Picture 2">
-            <a:extLst>
-              <a:ext uri="{FF2B5EF4-FFF2-40B4-BE49-F238E27FC236}">
-                <a16:creationId xmlns:a16="http://schemas.microsoft.com/office/drawing/2014/main" id="{3670DE6D-6939-461F-8294-7A8D0138A5BD}"/>
+          <p:cNvPr id="7" name="Picture 6">
+            <a:extLst>
+              <a:ext uri="{FF2B5EF4-FFF2-40B4-BE49-F238E27FC236}">
+                <a16:creationId xmlns:a16="http://schemas.microsoft.com/office/drawing/2014/main" id="{660EC852-7241-4EE4-9F2D-CB825706B101}"/>
               </a:ext>
             </a:extLst>
           </p:cNvPr>
@@ -3825,8 +3925,8 @@
         </p:blipFill>
         <p:spPr>
           <a:xfrm>
-            <a:off x="5655652" y="1690688"/>
-            <a:ext cx="5429250" cy="4543425"/>
+            <a:off x="1289721" y="3648075"/>
+            <a:ext cx="3381375" cy="685800"/>
           </a:xfrm>
           <a:prstGeom prst="rect">
             <a:avLst/>
@@ -3835,10 +3935,10 @@
       </p:pic>
       <p:pic>
         <p:nvPicPr>
-          <p:cNvPr id="6" name="Picture 5">
-            <a:extLst>
-              <a:ext uri="{FF2B5EF4-FFF2-40B4-BE49-F238E27FC236}">
-                <a16:creationId xmlns:a16="http://schemas.microsoft.com/office/drawing/2014/main" id="{7378D8D8-EE72-4DAD-8419-7E8C9E039681}"/>
+          <p:cNvPr id="8" name="Picture 7">
+            <a:extLst>
+              <a:ext uri="{FF2B5EF4-FFF2-40B4-BE49-F238E27FC236}">
+                <a16:creationId xmlns:a16="http://schemas.microsoft.com/office/drawing/2014/main" id="{8ADCE153-4794-4D42-836C-9F7BC1F3CDDE}"/>
               </a:ext>
             </a:extLst>
           </p:cNvPr>
@@ -3855,8 +3955,8 @@
         </p:blipFill>
         <p:spPr>
           <a:xfrm>
-            <a:off x="1107098" y="3559786"/>
-            <a:ext cx="3095625" cy="676275"/>
+            <a:off x="4972050" y="1743075"/>
+            <a:ext cx="5524500" cy="4495800"/>
           </a:xfrm>
           <a:prstGeom prst="rect">
             <a:avLst/>
@@ -3866,7 +3966,7 @@
     </p:spTree>
     <p:extLst>
       <p:ext uri="{BB962C8B-B14F-4D97-AF65-F5344CB8AC3E}">
-        <p14:creationId xmlns:p14="http://schemas.microsoft.com/office/powerpoint/2010/main" val="2419941365"/>
+        <p14:creationId xmlns:p14="http://schemas.microsoft.com/office/powerpoint/2010/main" val="2885476304"/>
       </p:ext>
     </p:extLst>
   </p:cSld>
@@ -3916,7 +4016,7 @@
           <a:p>
             <a:r>
               <a:rPr lang="en-US" dirty="0"/>
-              <a:t>Age prediction – Decision Tree Regressor</a:t>
+              <a:t>Age prediction – SVM linear</a:t>
             </a:r>
           </a:p>
         </p:txBody>
@@ -3926,7 +4026,7 @@
           <p:cNvPr id="4" name="Picture 3">
             <a:extLst>
               <a:ext uri="{FF2B5EF4-FFF2-40B4-BE49-F238E27FC236}">
-                <a16:creationId xmlns:a16="http://schemas.microsoft.com/office/drawing/2014/main" id="{5797480A-5945-4E1C-90BA-4E8EB893067A}"/>
+                <a16:creationId xmlns:a16="http://schemas.microsoft.com/office/drawing/2014/main" id="{A331BFB0-94EE-4BFC-BE62-DC96E6F1BE2A}"/>
               </a:ext>
             </a:extLst>
           </p:cNvPr>
@@ -3943,8 +4043,8 @@
         </p:blipFill>
         <p:spPr>
           <a:xfrm>
-            <a:off x="5344991" y="1813780"/>
-            <a:ext cx="5581650" cy="4457700"/>
+            <a:off x="5684045" y="1543050"/>
+            <a:ext cx="5667375" cy="4476750"/>
           </a:xfrm>
           <a:prstGeom prst="rect">
             <a:avLst/>
@@ -3956,7 +4056,7 @@
           <p:cNvPr id="5" name="Picture 4">
             <a:extLst>
               <a:ext uri="{FF2B5EF4-FFF2-40B4-BE49-F238E27FC236}">
-                <a16:creationId xmlns:a16="http://schemas.microsoft.com/office/drawing/2014/main" id="{BA725345-3A61-4A28-82AB-EF5D5821110E}"/>
+                <a16:creationId xmlns:a16="http://schemas.microsoft.com/office/drawing/2014/main" id="{13663E0E-1379-4F37-8C21-110FEB1D272F}"/>
               </a:ext>
             </a:extLst>
           </p:cNvPr>
@@ -3973,8 +4073,8 @@
         </p:blipFill>
         <p:spPr>
           <a:xfrm>
-            <a:off x="1265359" y="3709255"/>
-            <a:ext cx="2428875" cy="666750"/>
+            <a:off x="426244" y="3429000"/>
+            <a:ext cx="3248025" cy="704850"/>
           </a:xfrm>
           <a:prstGeom prst="rect">
             <a:avLst/>
@@ -3984,7 +4084,7 @@
     </p:spTree>
     <p:extLst>
       <p:ext uri="{BB962C8B-B14F-4D97-AF65-F5344CB8AC3E}">
-        <p14:creationId xmlns:p14="http://schemas.microsoft.com/office/powerpoint/2010/main" val="2521581391"/>
+        <p14:creationId xmlns:p14="http://schemas.microsoft.com/office/powerpoint/2010/main" val="2419941365"/>
       </p:ext>
     </p:extLst>
   </p:cSld>
@@ -4034,7 +4134,7 @@
           <a:p>
             <a:r>
               <a:rPr lang="en-US" dirty="0"/>
-              <a:t>Age prediction – Ridge</a:t>
+              <a:t>Age prediction – Decision Tree Regressor</a:t>
             </a:r>
           </a:p>
         </p:txBody>
@@ -4044,7 +4144,7 @@
           <p:cNvPr id="3" name="Picture 2">
             <a:extLst>
               <a:ext uri="{FF2B5EF4-FFF2-40B4-BE49-F238E27FC236}">
-                <a16:creationId xmlns:a16="http://schemas.microsoft.com/office/drawing/2014/main" id="{2F8694D7-DE09-4F6B-9984-0CCAA173862B}"/>
+                <a16:creationId xmlns:a16="http://schemas.microsoft.com/office/drawing/2014/main" id="{21168E06-DC74-4931-889B-5365DE490268}"/>
               </a:ext>
             </a:extLst>
           </p:cNvPr>
@@ -4061,8 +4161,8 @@
         </p:blipFill>
         <p:spPr>
           <a:xfrm>
-            <a:off x="5580550" y="1690688"/>
-            <a:ext cx="5438775" cy="4495800"/>
+            <a:off x="5071696" y="1690688"/>
+            <a:ext cx="5753100" cy="4543425"/>
           </a:xfrm>
           <a:prstGeom prst="rect">
             <a:avLst/>
@@ -4074,7 +4174,7 @@
           <p:cNvPr id="6" name="Picture 5">
             <a:extLst>
               <a:ext uri="{FF2B5EF4-FFF2-40B4-BE49-F238E27FC236}">
-                <a16:creationId xmlns:a16="http://schemas.microsoft.com/office/drawing/2014/main" id="{BE59F63F-F578-4CA8-96FA-680542AF201C}"/>
+                <a16:creationId xmlns:a16="http://schemas.microsoft.com/office/drawing/2014/main" id="{68D45AC9-E26A-4ACD-A1F0-203E1D360841}"/>
               </a:ext>
             </a:extLst>
           </p:cNvPr>
@@ -4091,8 +4191,8 @@
         </p:blipFill>
         <p:spPr>
           <a:xfrm>
-            <a:off x="1172675" y="3609975"/>
-            <a:ext cx="3295650" cy="657225"/>
+            <a:off x="1036027" y="3614738"/>
+            <a:ext cx="2476500" cy="695325"/>
           </a:xfrm>
           <a:prstGeom prst="rect">
             <a:avLst/>
@@ -4102,7 +4202,7 @@
     </p:spTree>
     <p:extLst>
       <p:ext uri="{BB962C8B-B14F-4D97-AF65-F5344CB8AC3E}">
-        <p14:creationId xmlns:p14="http://schemas.microsoft.com/office/powerpoint/2010/main" val="4238706540"/>
+        <p14:creationId xmlns:p14="http://schemas.microsoft.com/office/powerpoint/2010/main" val="2521581391"/>
       </p:ext>
     </p:extLst>
   </p:cSld>
@@ -4152,7 +4252,7 @@
           <a:p>
             <a:r>
               <a:rPr lang="en-US" dirty="0"/>
-              <a:t>Age prediction – Lasso</a:t>
+              <a:t>Age prediction – Ridge</a:t>
             </a:r>
           </a:p>
         </p:txBody>
@@ -4162,7 +4262,7 @@
           <p:cNvPr id="4" name="Picture 3">
             <a:extLst>
               <a:ext uri="{FF2B5EF4-FFF2-40B4-BE49-F238E27FC236}">
-                <a16:creationId xmlns:a16="http://schemas.microsoft.com/office/drawing/2014/main" id="{62B43D93-8FBA-4040-A027-EF1ACDB0E126}"/>
+                <a16:creationId xmlns:a16="http://schemas.microsoft.com/office/drawing/2014/main" id="{C96B1FD2-5AD4-43BD-BE0A-57030E93E4B4}"/>
               </a:ext>
             </a:extLst>
           </p:cNvPr>
@@ -4179,8 +4279,8 @@
         </p:blipFill>
         <p:spPr>
           <a:xfrm>
-            <a:off x="5598502" y="1457691"/>
-            <a:ext cx="5543550" cy="4505325"/>
+            <a:off x="5791200" y="1690688"/>
+            <a:ext cx="5562600" cy="4514850"/>
           </a:xfrm>
           <a:prstGeom prst="rect">
             <a:avLst/>
@@ -4192,7 +4292,7 @@
           <p:cNvPr id="5" name="Picture 4">
             <a:extLst>
               <a:ext uri="{FF2B5EF4-FFF2-40B4-BE49-F238E27FC236}">
-                <a16:creationId xmlns:a16="http://schemas.microsoft.com/office/drawing/2014/main" id="{CE83943B-8567-4B9C-8653-1EFC3D182B5D}"/>
+                <a16:creationId xmlns:a16="http://schemas.microsoft.com/office/drawing/2014/main" id="{448B5DF0-1145-458D-B6A1-22A3962CC2F1}"/>
               </a:ext>
             </a:extLst>
           </p:cNvPr>
@@ -4209,8 +4309,8 @@
         </p:blipFill>
         <p:spPr>
           <a:xfrm>
-            <a:off x="1410066" y="3325690"/>
-            <a:ext cx="3228975" cy="685800"/>
+            <a:off x="1040056" y="3614738"/>
+            <a:ext cx="3171825" cy="666750"/>
           </a:xfrm>
           <a:prstGeom prst="rect">
             <a:avLst/>
@@ -4220,7 +4320,7 @@
     </p:spTree>
     <p:extLst>
       <p:ext uri="{BB962C8B-B14F-4D97-AF65-F5344CB8AC3E}">
-        <p14:creationId xmlns:p14="http://schemas.microsoft.com/office/powerpoint/2010/main" val="3068234399"/>
+        <p14:creationId xmlns:p14="http://schemas.microsoft.com/office/powerpoint/2010/main" val="4238706540"/>
       </p:ext>
     </p:extLst>
   </p:cSld>
@@ -4270,13 +4370,8 @@
           <a:p>
             <a:r>
               <a:rPr lang="en-US" dirty="0"/>
-              <a:t>Age prediction – </a:t>
-            </a:r>
-            <a:r>
-              <a:rPr lang="en-US" dirty="0" err="1"/>
-              <a:t>ElasticNet</a:t>
-            </a:r>
-            <a:endParaRPr lang="en-US" dirty="0"/>
+              <a:t>Age prediction – Lasso</a:t>
+            </a:r>
           </a:p>
         </p:txBody>
       </p:sp>
@@ -4285,7 +4380,7 @@
           <p:cNvPr id="3" name="Picture 2">
             <a:extLst>
               <a:ext uri="{FF2B5EF4-FFF2-40B4-BE49-F238E27FC236}">
-                <a16:creationId xmlns:a16="http://schemas.microsoft.com/office/drawing/2014/main" id="{10EC651B-AEF0-43E2-A045-9CEB2DABAA3C}"/>
+                <a16:creationId xmlns:a16="http://schemas.microsoft.com/office/drawing/2014/main" id="{EA899C3C-76A6-496E-9753-ED63C3BE542D}"/>
               </a:ext>
             </a:extLst>
           </p:cNvPr>
@@ -4302,8 +4397,8 @@
         </p:blipFill>
         <p:spPr>
           <a:xfrm>
-            <a:off x="5420091" y="1690688"/>
-            <a:ext cx="5572125" cy="4562475"/>
+            <a:off x="5486033" y="1690688"/>
+            <a:ext cx="5534025" cy="4514850"/>
           </a:xfrm>
           <a:prstGeom prst="rect">
             <a:avLst/>
@@ -4315,7 +4410,7 @@
           <p:cNvPr id="6" name="Picture 5">
             <a:extLst>
               <a:ext uri="{FF2B5EF4-FFF2-40B4-BE49-F238E27FC236}">
-                <a16:creationId xmlns:a16="http://schemas.microsoft.com/office/drawing/2014/main" id="{B7B54505-009C-4B6E-AAA7-7256CF734491}"/>
+                <a16:creationId xmlns:a16="http://schemas.microsoft.com/office/drawing/2014/main" id="{C2D97B16-2463-4F28-9E8F-C05B8B34A7B5}"/>
               </a:ext>
             </a:extLst>
           </p:cNvPr>
@@ -4332,38 +4427,8 @@
         </p:blipFill>
         <p:spPr>
           <a:xfrm>
-            <a:off x="771891" y="4391025"/>
-            <a:ext cx="3209925" cy="514350"/>
-          </a:xfrm>
-          <a:prstGeom prst="rect">
-            <a:avLst/>
-          </a:prstGeom>
-        </p:spPr>
-      </p:pic>
-      <p:pic>
-        <p:nvPicPr>
-          <p:cNvPr id="8" name="Picture 7">
-            <a:extLst>
-              <a:ext uri="{FF2B5EF4-FFF2-40B4-BE49-F238E27FC236}">
-                <a16:creationId xmlns:a16="http://schemas.microsoft.com/office/drawing/2014/main" id="{77F7EF6A-3940-44FC-9226-C9DBEC95EBD3}"/>
-              </a:ext>
-            </a:extLst>
-          </p:cNvPr>
-          <p:cNvPicPr>
-            <a:picLocks noChangeAspect="1"/>
-          </p:cNvPicPr>
-          <p:nvPr/>
-        </p:nvPicPr>
-        <p:blipFill>
-          <a:blip r:embed="rId4"/>
-          <a:stretch>
-            <a:fillRect/>
-          </a:stretch>
-        </p:blipFill>
-        <p:spPr>
-          <a:xfrm>
-            <a:off x="771891" y="4181475"/>
-            <a:ext cx="2314575" cy="209550"/>
+            <a:off x="902676" y="3614738"/>
+            <a:ext cx="3133725" cy="666750"/>
           </a:xfrm>
           <a:prstGeom prst="rect">
             <a:avLst/>
@@ -4373,7 +4438,7 @@
     </p:spTree>
     <p:extLst>
       <p:ext uri="{BB962C8B-B14F-4D97-AF65-F5344CB8AC3E}">
-        <p14:creationId xmlns:p14="http://schemas.microsoft.com/office/powerpoint/2010/main" val="916169762"/>
+        <p14:creationId xmlns:p14="http://schemas.microsoft.com/office/powerpoint/2010/main" val="3068234399"/>
       </p:ext>
     </p:extLst>
   </p:cSld>
@@ -4427,7 +4492,7 @@
             </a:r>
             <a:r>
               <a:rPr lang="en-US" dirty="0" err="1"/>
-              <a:t>BayesianRidge</a:t>
+              <a:t>ElasticNet</a:t>
             </a:r>
             <a:endParaRPr lang="en-US" dirty="0"/>
           </a:p>
@@ -4438,7 +4503,7 @@
           <p:cNvPr id="4" name="Picture 3">
             <a:extLst>
               <a:ext uri="{FF2B5EF4-FFF2-40B4-BE49-F238E27FC236}">
-                <a16:creationId xmlns:a16="http://schemas.microsoft.com/office/drawing/2014/main" id="{1CFE7EF3-8399-4749-8CDD-66DA8477D32B}"/>
+                <a16:creationId xmlns:a16="http://schemas.microsoft.com/office/drawing/2014/main" id="{E0AF8541-742D-4361-851E-678FACFE7F69}"/>
               </a:ext>
             </a:extLst>
           </p:cNvPr>
@@ -4455,8 +4520,8 @@
         </p:blipFill>
         <p:spPr>
           <a:xfrm>
-            <a:off x="5867400" y="1690688"/>
-            <a:ext cx="5486400" cy="4457700"/>
+            <a:off x="5886450" y="1690688"/>
+            <a:ext cx="5467350" cy="4524375"/>
           </a:xfrm>
           <a:prstGeom prst="rect">
             <a:avLst/>
@@ -4468,7 +4533,7 @@
           <p:cNvPr id="5" name="Picture 4">
             <a:extLst>
               <a:ext uri="{FF2B5EF4-FFF2-40B4-BE49-F238E27FC236}">
-                <a16:creationId xmlns:a16="http://schemas.microsoft.com/office/drawing/2014/main" id="{536E38CC-432D-4CE4-AE6D-605EDEFF0D98}"/>
+                <a16:creationId xmlns:a16="http://schemas.microsoft.com/office/drawing/2014/main" id="{0817778C-6587-4F84-B73E-B7CBF4E397E7}"/>
               </a:ext>
             </a:extLst>
           </p:cNvPr>
@@ -4485,8 +4550,38 @@
         </p:blipFill>
         <p:spPr>
           <a:xfrm>
-            <a:off x="1232754" y="3919538"/>
-            <a:ext cx="3114675" cy="647700"/>
+            <a:off x="838200" y="3686175"/>
+            <a:ext cx="3219450" cy="533400"/>
+          </a:xfrm>
+          <a:prstGeom prst="rect">
+            <a:avLst/>
+          </a:prstGeom>
+        </p:spPr>
+      </p:pic>
+      <p:pic>
+        <p:nvPicPr>
+          <p:cNvPr id="7" name="Picture 6">
+            <a:extLst>
+              <a:ext uri="{FF2B5EF4-FFF2-40B4-BE49-F238E27FC236}">
+                <a16:creationId xmlns:a16="http://schemas.microsoft.com/office/drawing/2014/main" id="{CB7E030F-1304-4FDD-9D3D-ABF5F16527C2}"/>
+              </a:ext>
+            </a:extLst>
+          </p:cNvPr>
+          <p:cNvPicPr>
+            <a:picLocks noChangeAspect="1"/>
+          </p:cNvPicPr>
+          <p:nvPr/>
+        </p:nvPicPr>
+        <p:blipFill>
+          <a:blip r:embed="rId4"/>
+          <a:stretch>
+            <a:fillRect/>
+          </a:stretch>
+        </p:blipFill>
+        <p:spPr>
+          <a:xfrm>
+            <a:off x="838200" y="3486150"/>
+            <a:ext cx="2409825" cy="200025"/>
           </a:xfrm>
           <a:prstGeom prst="rect">
             <a:avLst/>
@@ -4496,7 +4591,7 @@
     </p:spTree>
     <p:extLst>
       <p:ext uri="{BB962C8B-B14F-4D97-AF65-F5344CB8AC3E}">
-        <p14:creationId xmlns:p14="http://schemas.microsoft.com/office/powerpoint/2010/main" val="141751099"/>
+        <p14:creationId xmlns:p14="http://schemas.microsoft.com/office/powerpoint/2010/main" val="916169762"/>
       </p:ext>
     </p:extLst>
   </p:cSld>

</xml_diff>